<commit_message>
d6 and terraform MCQ
</commit_message>
<xml_diff>
--- a/D4/PPT08-Kubernetes -Env-variables.pptx
+++ b/D4/PPT08-Kubernetes -Env-variables.pptx
@@ -255,7 +255,7 @@
           <a:p>
             <a:fld id="{20113C94-94BA-419B-BA8F-B470F2B656FD}" type="datetimeFigureOut">
               <a:rPr lang="en-IN" smtClean="0"/>
-              <a:t>30-06-2025</a:t>
+              <a:t>02-09-2025</a:t>
             </a:fld>
             <a:endParaRPr lang="en-IN"/>
           </a:p>
@@ -1055,7 +1055,7 @@
           <a:p>
             <a:fld id="{EC651DDC-3D8E-441D-8B1E-684C450C1B0A}" type="datetimeFigureOut">
               <a:rPr lang="en-US" smtClean="0"/>
-              <a:t>6/30/2025</a:t>
+              <a:t>9/2/2025</a:t>
             </a:fld>
             <a:endParaRPr lang="en-US"/>
           </a:p>
@@ -1223,7 +1223,7 @@
           <a:p>
             <a:fld id="{EC651DDC-3D8E-441D-8B1E-684C450C1B0A}" type="datetimeFigureOut">
               <a:rPr lang="en-US" smtClean="0"/>
-              <a:t>6/30/2025</a:t>
+              <a:t>9/2/2025</a:t>
             </a:fld>
             <a:endParaRPr lang="en-US"/>
           </a:p>
@@ -1401,7 +1401,7 @@
           <a:p>
             <a:fld id="{EC651DDC-3D8E-441D-8B1E-684C450C1B0A}" type="datetimeFigureOut">
               <a:rPr lang="en-US" smtClean="0"/>
-              <a:t>6/30/2025</a:t>
+              <a:t>9/2/2025</a:t>
             </a:fld>
             <a:endParaRPr lang="en-US"/>
           </a:p>
@@ -1592,12 +1592,6 @@
               <a:t>Vishwanath M S</a:t>
             </a:r>
           </a:p>
-          <a:p>
-            <a:r>
-              <a:rPr lang="en-US" dirty="0"/>
-              <a:t>Vishwacloudlab.org</a:t>
-            </a:r>
-          </a:p>
         </p:txBody>
       </p:sp>
       <p:sp>
@@ -1618,7 +1612,7 @@
             <a:fld id="{5B03344B-D0D9-437D-8838-1FD1C4F164B7}" type="datetimeFigureOut">
               <a:rPr lang="en-US" smtClean="0"/>
               <a:pPr/>
-              <a:t>6/30/2025</a:t>
+              <a:t>9/2/2025</a:t>
             </a:fld>
             <a:endParaRPr lang="en-US"/>
           </a:p>
@@ -1799,7 +1793,7 @@
             <a:fld id="{5B03344B-D0D9-437D-8838-1FD1C4F164B7}" type="datetimeFigureOut">
               <a:rPr lang="en-US" smtClean="0"/>
               <a:pPr/>
-              <a:t>6/30/2025</a:t>
+              <a:t>9/2/2025</a:t>
             </a:fld>
             <a:endParaRPr lang="en-US"/>
           </a:p>
@@ -1850,42 +1844,6 @@
               <a:t>‹#›</a:t>
             </a:fld>
             <a:endParaRPr lang="en-US"/>
-          </a:p>
-        </p:txBody>
-      </p:sp>
-      <p:sp>
-        <p:nvSpPr>
-          <p:cNvPr id="8" name="TextBox 7"/>
-          <p:cNvSpPr txBox="1"/>
-          <p:nvPr userDrawn="1"/>
-        </p:nvSpPr>
-        <p:spPr>
-          <a:xfrm>
-            <a:off x="8508989" y="6521337"/>
-            <a:ext cx="3795976" cy="369332"/>
-          </a:xfrm>
-          <a:prstGeom prst="rect">
-            <a:avLst/>
-          </a:prstGeom>
-          <a:noFill/>
-        </p:spPr>
-        <p:txBody>
-          <a:bodyPr wrap="none" rtlCol="0">
-            <a:spAutoFit/>
-          </a:bodyPr>
-          <a:lstStyle/>
-          <a:p>
-            <a:r>
-              <a:rPr lang="en-US" dirty="0">
-                <a:solidFill>
-                  <a:srgbClr val="FFFFFF">
-                    <a:lumMod val="50000"/>
-                  </a:srgbClr>
-                </a:solidFill>
-                <a:latin typeface="Engravers MT" panose="02090707080505020304" pitchFamily="18" charset="0"/>
-              </a:rPr>
-              <a:t>VISHWACLOUDLAB.ORG</a:t>
-            </a:r>
           </a:p>
         </p:txBody>
       </p:sp>
@@ -2266,7 +2224,7 @@
             <a:fld id="{5B03344B-D0D9-437D-8838-1FD1C4F164B7}" type="datetimeFigureOut">
               <a:rPr lang="en-US" smtClean="0"/>
               <a:pPr/>
-              <a:t>6/30/2025</a:t>
+              <a:t>9/2/2025</a:t>
             </a:fld>
             <a:endParaRPr lang="en-US"/>
           </a:p>
@@ -2358,42 +2316,6 @@
           </a:fontRef>
         </p:style>
       </p:cxnSp>
-      <p:sp>
-        <p:nvSpPr>
-          <p:cNvPr id="10" name="TextBox 9"/>
-          <p:cNvSpPr txBox="1"/>
-          <p:nvPr userDrawn="1"/>
-        </p:nvSpPr>
-        <p:spPr>
-          <a:xfrm>
-            <a:off x="8508989" y="6521337"/>
-            <a:ext cx="3795976" cy="369332"/>
-          </a:xfrm>
-          <a:prstGeom prst="rect">
-            <a:avLst/>
-          </a:prstGeom>
-          <a:noFill/>
-        </p:spPr>
-        <p:txBody>
-          <a:bodyPr wrap="none" rtlCol="0">
-            <a:spAutoFit/>
-          </a:bodyPr>
-          <a:lstStyle/>
-          <a:p>
-            <a:r>
-              <a:rPr lang="en-US" dirty="0">
-                <a:solidFill>
-                  <a:srgbClr val="FFFFFF">
-                    <a:lumMod val="85000"/>
-                  </a:srgbClr>
-                </a:solidFill>
-                <a:latin typeface="Engravers MT" panose="02090707080505020304" pitchFamily="18" charset="0"/>
-              </a:rPr>
-              <a:t>VISHWACLOUDLAB.ORG</a:t>
-            </a:r>
-          </a:p>
-        </p:txBody>
-      </p:sp>
     </p:spTree>
     <p:extLst>
       <p:ext uri="{BB962C8B-B14F-4D97-AF65-F5344CB8AC3E}">
@@ -2584,7 +2506,7 @@
             <a:fld id="{5B03344B-D0D9-437D-8838-1FD1C4F164B7}" type="datetimeFigureOut">
               <a:rPr lang="en-US" smtClean="0"/>
               <a:pPr/>
-              <a:t>6/30/2025</a:t>
+              <a:t>9/2/2025</a:t>
             </a:fld>
             <a:endParaRPr lang="en-US"/>
           </a:p>
@@ -2630,42 +2552,6 @@
               <a:t>‹#›</a:t>
             </a:fld>
             <a:endParaRPr lang="en-US"/>
-          </a:p>
-        </p:txBody>
-      </p:sp>
-      <p:sp>
-        <p:nvSpPr>
-          <p:cNvPr id="9" name="TextBox 8"/>
-          <p:cNvSpPr txBox="1"/>
-          <p:nvPr userDrawn="1"/>
-        </p:nvSpPr>
-        <p:spPr>
-          <a:xfrm>
-            <a:off x="8508989" y="6521337"/>
-            <a:ext cx="3795976" cy="369332"/>
-          </a:xfrm>
-          <a:prstGeom prst="rect">
-            <a:avLst/>
-          </a:prstGeom>
-          <a:noFill/>
-        </p:spPr>
-        <p:txBody>
-          <a:bodyPr wrap="none" rtlCol="0">
-            <a:spAutoFit/>
-          </a:bodyPr>
-          <a:lstStyle/>
-          <a:p>
-            <a:r>
-              <a:rPr lang="en-US" dirty="0">
-                <a:solidFill>
-                  <a:srgbClr val="FFFFFF">
-                    <a:lumMod val="50000"/>
-                  </a:srgbClr>
-                </a:solidFill>
-                <a:latin typeface="Engravers MT" panose="02090707080505020304" pitchFamily="18" charset="0"/>
-              </a:rPr>
-              <a:t>VISHWACLOUDLAB.ORG</a:t>
-            </a:r>
           </a:p>
         </p:txBody>
       </p:sp>
@@ -3001,7 +2887,7 @@
             <a:fld id="{5B03344B-D0D9-437D-8838-1FD1C4F164B7}" type="datetimeFigureOut">
               <a:rPr lang="en-US" smtClean="0"/>
               <a:pPr/>
-              <a:t>6/30/2025</a:t>
+              <a:t>9/2/2025</a:t>
             </a:fld>
             <a:endParaRPr lang="en-US"/>
           </a:p>
@@ -3047,42 +2933,6 @@
               <a:t>‹#›</a:t>
             </a:fld>
             <a:endParaRPr lang="en-US"/>
-          </a:p>
-        </p:txBody>
-      </p:sp>
-      <p:sp>
-        <p:nvSpPr>
-          <p:cNvPr id="11" name="TextBox 10"/>
-          <p:cNvSpPr txBox="1"/>
-          <p:nvPr userDrawn="1"/>
-        </p:nvSpPr>
-        <p:spPr>
-          <a:xfrm>
-            <a:off x="8508989" y="6521337"/>
-            <a:ext cx="3795976" cy="369332"/>
-          </a:xfrm>
-          <a:prstGeom prst="rect">
-            <a:avLst/>
-          </a:prstGeom>
-          <a:noFill/>
-        </p:spPr>
-        <p:txBody>
-          <a:bodyPr wrap="none" rtlCol="0">
-            <a:spAutoFit/>
-          </a:bodyPr>
-          <a:lstStyle/>
-          <a:p>
-            <a:r>
-              <a:rPr lang="en-US" dirty="0">
-                <a:solidFill>
-                  <a:srgbClr val="FFFFFF">
-                    <a:lumMod val="50000"/>
-                  </a:srgbClr>
-                </a:solidFill>
-                <a:latin typeface="Engravers MT" panose="02090707080505020304" pitchFamily="18" charset="0"/>
-              </a:rPr>
-              <a:t>VISHWACLOUDLAB.ORG</a:t>
-            </a:r>
           </a:p>
         </p:txBody>
       </p:sp>
@@ -3157,7 +3007,7 @@
             <a:fld id="{5B03344B-D0D9-437D-8838-1FD1C4F164B7}" type="datetimeFigureOut">
               <a:rPr lang="en-US" smtClean="0"/>
               <a:pPr/>
-              <a:t>6/30/2025</a:t>
+              <a:t>9/2/2025</a:t>
             </a:fld>
             <a:endParaRPr lang="en-US"/>
           </a:p>
@@ -3203,42 +3053,6 @@
               <a:t>‹#›</a:t>
             </a:fld>
             <a:endParaRPr lang="en-US"/>
-          </a:p>
-        </p:txBody>
-      </p:sp>
-      <p:sp>
-        <p:nvSpPr>
-          <p:cNvPr id="6" name="TextBox 5"/>
-          <p:cNvSpPr txBox="1"/>
-          <p:nvPr userDrawn="1"/>
-        </p:nvSpPr>
-        <p:spPr>
-          <a:xfrm>
-            <a:off x="8508989" y="6521337"/>
-            <a:ext cx="3795976" cy="369332"/>
-          </a:xfrm>
-          <a:prstGeom prst="rect">
-            <a:avLst/>
-          </a:prstGeom>
-          <a:noFill/>
-        </p:spPr>
-        <p:txBody>
-          <a:bodyPr wrap="none" rtlCol="0">
-            <a:spAutoFit/>
-          </a:bodyPr>
-          <a:lstStyle/>
-          <a:p>
-            <a:r>
-              <a:rPr lang="en-US" dirty="0">
-                <a:solidFill>
-                  <a:srgbClr val="FFFFFF">
-                    <a:lumMod val="50000"/>
-                  </a:srgbClr>
-                </a:solidFill>
-                <a:latin typeface="Engravers MT" panose="02090707080505020304" pitchFamily="18" charset="0"/>
-              </a:rPr>
-              <a:t>VISHWACLOUDLAB.ORG</a:t>
-            </a:r>
           </a:p>
         </p:txBody>
       </p:sp>
@@ -3368,7 +3182,7 @@
             <a:fld id="{5B03344B-D0D9-437D-8838-1FD1C4F164B7}" type="datetimeFigureOut">
               <a:rPr lang="en-US" smtClean="0"/>
               <a:pPr/>
-              <a:t>6/30/2025</a:t>
+              <a:t>9/2/2025</a:t>
             </a:fld>
             <a:endParaRPr lang="en-US"/>
           </a:p>
@@ -3422,42 +3236,6 @@
               <a:t>‹#›</a:t>
             </a:fld>
             <a:endParaRPr lang="en-US"/>
-          </a:p>
-        </p:txBody>
-      </p:sp>
-      <p:sp>
-        <p:nvSpPr>
-          <p:cNvPr id="10" name="TextBox 9"/>
-          <p:cNvSpPr txBox="1"/>
-          <p:nvPr userDrawn="1"/>
-        </p:nvSpPr>
-        <p:spPr>
-          <a:xfrm>
-            <a:off x="8508989" y="6521337"/>
-            <a:ext cx="3795976" cy="369332"/>
-          </a:xfrm>
-          <a:prstGeom prst="rect">
-            <a:avLst/>
-          </a:prstGeom>
-          <a:noFill/>
-        </p:spPr>
-        <p:txBody>
-          <a:bodyPr wrap="none" rtlCol="0">
-            <a:spAutoFit/>
-          </a:bodyPr>
-          <a:lstStyle/>
-          <a:p>
-            <a:r>
-              <a:rPr lang="en-US" dirty="0">
-                <a:solidFill>
-                  <a:srgbClr val="FFFFFF">
-                    <a:lumMod val="85000"/>
-                  </a:srgbClr>
-                </a:solidFill>
-                <a:latin typeface="Engravers MT" panose="02090707080505020304" pitchFamily="18" charset="0"/>
-              </a:rPr>
-              <a:t>VISHWACLOUDLAB.ORG</a:t>
-            </a:r>
           </a:p>
         </p:txBody>
       </p:sp>
@@ -3762,7 +3540,7 @@
             <a:fld id="{5B03344B-D0D9-437D-8838-1FD1C4F164B7}" type="datetimeFigureOut">
               <a:rPr lang="en-US" smtClean="0"/>
               <a:pPr/>
-              <a:t>6/30/2025</a:t>
+              <a:t>9/2/2025</a:t>
             </a:fld>
             <a:endParaRPr lang="en-US"/>
           </a:p>
@@ -3841,42 +3619,6 @@
                 <a:srgbClr val="46464A"/>
               </a:solidFill>
             </a:endParaRPr>
-          </a:p>
-        </p:txBody>
-      </p:sp>
-      <p:sp>
-        <p:nvSpPr>
-          <p:cNvPr id="10" name="TextBox 9"/>
-          <p:cNvSpPr txBox="1"/>
-          <p:nvPr userDrawn="1"/>
-        </p:nvSpPr>
-        <p:spPr>
-          <a:xfrm>
-            <a:off x="8508989" y="6521337"/>
-            <a:ext cx="3795976" cy="369332"/>
-          </a:xfrm>
-          <a:prstGeom prst="rect">
-            <a:avLst/>
-          </a:prstGeom>
-          <a:noFill/>
-        </p:spPr>
-        <p:txBody>
-          <a:bodyPr wrap="none" rtlCol="0">
-            <a:spAutoFit/>
-          </a:bodyPr>
-          <a:lstStyle/>
-          <a:p>
-            <a:r>
-              <a:rPr lang="en-US" dirty="0">
-                <a:solidFill>
-                  <a:srgbClr val="FFFFFF">
-                    <a:lumMod val="50000"/>
-                  </a:srgbClr>
-                </a:solidFill>
-                <a:latin typeface="Engravers MT" panose="02090707080505020304" pitchFamily="18" charset="0"/>
-              </a:rPr>
-              <a:t>VISHWACLOUDLAB.ORG</a:t>
-            </a:r>
           </a:p>
         </p:txBody>
       </p:sp>
@@ -4000,7 +3742,7 @@
           <a:p>
             <a:fld id="{EC651DDC-3D8E-441D-8B1E-684C450C1B0A}" type="datetimeFigureOut">
               <a:rPr lang="en-US" smtClean="0"/>
-              <a:t>6/30/2025</a:t>
+              <a:t>9/2/2025</a:t>
             </a:fld>
             <a:endParaRPr lang="en-US"/>
           </a:p>
@@ -4359,7 +4101,7 @@
             <a:fld id="{5B03344B-D0D9-437D-8838-1FD1C4F164B7}" type="datetimeFigureOut">
               <a:rPr lang="en-US" smtClean="0"/>
               <a:pPr/>
-              <a:t>6/30/2025</a:t>
+              <a:t>9/2/2025</a:t>
             </a:fld>
             <a:endParaRPr lang="en-US"/>
           </a:p>
@@ -4567,7 +4309,7 @@
             <a:fld id="{5B03344B-D0D9-437D-8838-1FD1C4F164B7}" type="datetimeFigureOut">
               <a:rPr lang="en-US" smtClean="0"/>
               <a:pPr/>
-              <a:t>6/30/2025</a:t>
+              <a:t>9/2/2025</a:t>
             </a:fld>
             <a:endParaRPr lang="en-US"/>
           </a:p>
@@ -4613,42 +4355,6 @@
               <a:t>‹#›</a:t>
             </a:fld>
             <a:endParaRPr lang="en-US"/>
-          </a:p>
-        </p:txBody>
-      </p:sp>
-      <p:sp>
-        <p:nvSpPr>
-          <p:cNvPr id="7" name="TextBox 6"/>
-          <p:cNvSpPr txBox="1"/>
-          <p:nvPr userDrawn="1"/>
-        </p:nvSpPr>
-        <p:spPr>
-          <a:xfrm>
-            <a:off x="8508989" y="6521337"/>
-            <a:ext cx="3795976" cy="369332"/>
-          </a:xfrm>
-          <a:prstGeom prst="rect">
-            <a:avLst/>
-          </a:prstGeom>
-          <a:noFill/>
-        </p:spPr>
-        <p:txBody>
-          <a:bodyPr wrap="none" rtlCol="0">
-            <a:spAutoFit/>
-          </a:bodyPr>
-          <a:lstStyle/>
-          <a:p>
-            <a:r>
-              <a:rPr lang="en-US" dirty="0">
-                <a:solidFill>
-                  <a:srgbClr val="FFFFFF">
-                    <a:lumMod val="50000"/>
-                  </a:srgbClr>
-                </a:solidFill>
-                <a:latin typeface="Engravers MT" panose="02090707080505020304" pitchFamily="18" charset="0"/>
-              </a:rPr>
-              <a:t>VISHWACLOUDLAB.ORG</a:t>
-            </a:r>
           </a:p>
         </p:txBody>
       </p:sp>
@@ -4863,7 +4569,7 @@
             <a:fld id="{5B03344B-D0D9-437D-8838-1FD1C4F164B7}" type="datetimeFigureOut">
               <a:rPr lang="en-US" smtClean="0"/>
               <a:pPr/>
-              <a:t>6/30/2025</a:t>
+              <a:t>9/2/2025</a:t>
             </a:fld>
             <a:endParaRPr lang="en-US"/>
           </a:p>
@@ -5145,7 +4851,7 @@
           <a:p>
             <a:fld id="{EC651DDC-3D8E-441D-8B1E-684C450C1B0A}" type="datetimeFigureOut">
               <a:rPr lang="en-US" smtClean="0"/>
-              <a:t>6/30/2025</a:t>
+              <a:t>9/2/2025</a:t>
             </a:fld>
             <a:endParaRPr lang="en-US"/>
           </a:p>
@@ -5374,7 +5080,7 @@
           <a:p>
             <a:fld id="{EC651DDC-3D8E-441D-8B1E-684C450C1B0A}" type="datetimeFigureOut">
               <a:rPr lang="en-US" smtClean="0"/>
-              <a:t>6/30/2025</a:t>
+              <a:t>9/2/2025</a:t>
             </a:fld>
             <a:endParaRPr lang="en-US"/>
           </a:p>
@@ -5738,7 +5444,7 @@
           <a:p>
             <a:fld id="{EC651DDC-3D8E-441D-8B1E-684C450C1B0A}" type="datetimeFigureOut">
               <a:rPr lang="en-US" smtClean="0"/>
-              <a:t>6/30/2025</a:t>
+              <a:t>9/2/2025</a:t>
             </a:fld>
             <a:endParaRPr lang="en-US"/>
           </a:p>
@@ -5855,7 +5561,7 @@
           <a:p>
             <a:fld id="{EC651DDC-3D8E-441D-8B1E-684C450C1B0A}" type="datetimeFigureOut">
               <a:rPr lang="en-US" smtClean="0"/>
-              <a:t>6/30/2025</a:t>
+              <a:t>9/2/2025</a:t>
             </a:fld>
             <a:endParaRPr lang="en-US"/>
           </a:p>
@@ -5950,7 +5656,7 @@
           <a:p>
             <a:fld id="{EC651DDC-3D8E-441D-8B1E-684C450C1B0A}" type="datetimeFigureOut">
               <a:rPr lang="en-US" smtClean="0"/>
-              <a:t>6/30/2025</a:t>
+              <a:t>9/2/2025</a:t>
             </a:fld>
             <a:endParaRPr lang="en-US"/>
           </a:p>
@@ -6225,7 +5931,7 @@
           <a:p>
             <a:fld id="{EC651DDC-3D8E-441D-8B1E-684C450C1B0A}" type="datetimeFigureOut">
               <a:rPr lang="en-US" smtClean="0"/>
-              <a:t>6/30/2025</a:t>
+              <a:t>9/2/2025</a:t>
             </a:fld>
             <a:endParaRPr lang="en-US"/>
           </a:p>
@@ -6477,7 +6183,7 @@
           <a:p>
             <a:fld id="{EC651DDC-3D8E-441D-8B1E-684C450C1B0A}" type="datetimeFigureOut">
               <a:rPr lang="en-US" smtClean="0"/>
-              <a:t>6/30/2025</a:t>
+              <a:t>9/2/2025</a:t>
             </a:fld>
             <a:endParaRPr lang="en-US"/>
           </a:p>
@@ -6688,7 +6394,7 @@
           <a:p>
             <a:fld id="{EC651DDC-3D8E-441D-8B1E-684C450C1B0A}" type="datetimeFigureOut">
               <a:rPr lang="en-US" smtClean="0"/>
-              <a:t>6/30/2025</a:t>
+              <a:t>9/2/2025</a:t>
             </a:fld>
             <a:endParaRPr lang="en-US"/>
           </a:p>
@@ -7257,7 +6963,7 @@
             <a:fld id="{5B03344B-D0D9-437D-8838-1FD1C4F164B7}" type="datetimeFigureOut">
               <a:rPr lang="en-US" smtClean="0"/>
               <a:pPr/>
-              <a:t>6/30/2025</a:t>
+              <a:t>9/2/2025</a:t>
             </a:fld>
             <a:endParaRPr lang="en-US"/>
           </a:p>
@@ -7810,17 +7516,6 @@
                 <a:latin typeface="Arial Rounded MT Bold" panose="020F0704030504030204" pitchFamily="34" charset="0"/>
               </a:rPr>
               <a:t> m s</a:t>
-            </a:r>
-          </a:p>
-          <a:p>
-            <a:r>
-              <a:rPr lang="en-US" b="1" dirty="0">
-                <a:solidFill>
-                  <a:srgbClr val="0070C0"/>
-                </a:solidFill>
-                <a:latin typeface="Arial Rounded MT Bold" panose="020F0704030504030204" pitchFamily="34" charset="0"/>
-              </a:rPr>
-              <a:t>VISHWACLOUDLAB.com</a:t>
             </a:r>
           </a:p>
         </p:txBody>

</xml_diff>